<commit_message>
saved promo_slide in alternate formats, more setup work on actual poster
</commit_message>
<xml_diff>
--- a/promo_slide.pptx
+++ b/promo_slide.pptx
@@ -64,7 +64,7 @@
         <p:spPr>
           <a:xfrm>
             <a:off x="504000" y="301320"/>
-            <a:ext cx="9071280" cy="1262520"/>
+            <a:ext cx="9072000" cy="1262160"/>
           </a:xfrm>
           <a:prstGeom prst="rect">
             <a:avLst/>
@@ -165,7 +165,7 @@
         <p:spPr>
           <a:xfrm>
             <a:off x="504000" y="301320"/>
-            <a:ext cx="9071280" cy="1262520"/>
+            <a:ext cx="9072000" cy="1262160"/>
           </a:xfrm>
           <a:prstGeom prst="rect">
             <a:avLst/>
@@ -318,7 +318,7 @@
         <p:spPr>
           <a:xfrm>
             <a:off x="504000" y="301320"/>
-            <a:ext cx="9071280" cy="1262520"/>
+            <a:ext cx="9072000" cy="1262160"/>
           </a:xfrm>
           <a:prstGeom prst="rect">
             <a:avLst/>
@@ -469,7 +469,7 @@
         <p:spPr>
           <a:xfrm>
             <a:off x="504000" y="301320"/>
-            <a:ext cx="9071280" cy="1262520"/>
+            <a:ext cx="9072000" cy="1262160"/>
           </a:xfrm>
           <a:prstGeom prst="rect">
             <a:avLst/>
@@ -545,7 +545,7 @@
         <p:spPr>
           <a:xfrm>
             <a:off x="504000" y="301320"/>
-            <a:ext cx="9071280" cy="1262520"/>
+            <a:ext cx="9072000" cy="1262160"/>
           </a:xfrm>
           <a:prstGeom prst="rect">
             <a:avLst/>
@@ -620,7 +620,7 @@
         <p:spPr>
           <a:xfrm>
             <a:off x="504000" y="301320"/>
-            <a:ext cx="9071280" cy="1262520"/>
+            <a:ext cx="9072000" cy="1262160"/>
           </a:xfrm>
           <a:prstGeom prst="rect">
             <a:avLst/>
@@ -721,7 +721,7 @@
         <p:spPr>
           <a:xfrm>
             <a:off x="504000" y="301320"/>
-            <a:ext cx="9071280" cy="1262520"/>
+            <a:ext cx="9072000" cy="1262160"/>
           </a:xfrm>
           <a:prstGeom prst="rect">
             <a:avLst/>
@@ -770,7 +770,7 @@
         <p:spPr>
           <a:xfrm>
             <a:off x="504000" y="301320"/>
-            <a:ext cx="9071280" cy="5852160"/>
+            <a:ext cx="9072000" cy="5850720"/>
           </a:xfrm>
           <a:prstGeom prst="rect">
             <a:avLst/>
@@ -819,7 +819,7 @@
         <p:spPr>
           <a:xfrm>
             <a:off x="504000" y="301320"/>
-            <a:ext cx="9071280" cy="1262520"/>
+            <a:ext cx="9072000" cy="1262160"/>
           </a:xfrm>
           <a:prstGeom prst="rect">
             <a:avLst/>
@@ -946,7 +946,7 @@
         <p:spPr>
           <a:xfrm>
             <a:off x="504000" y="301320"/>
-            <a:ext cx="9071280" cy="1262520"/>
+            <a:ext cx="9072000" cy="1262160"/>
           </a:xfrm>
           <a:prstGeom prst="rect">
             <a:avLst/>
@@ -1073,7 +1073,7 @@
         <p:spPr>
           <a:xfrm>
             <a:off x="504000" y="301320"/>
-            <a:ext cx="9071280" cy="1262520"/>
+            <a:ext cx="9072000" cy="1262160"/>
           </a:xfrm>
           <a:prstGeom prst="rect">
             <a:avLst/>
@@ -1207,7 +1207,7 @@
         <p:spPr>
           <a:xfrm>
             <a:off x="504000" y="301320"/>
-            <a:ext cx="9071280" cy="1262160"/>
+            <a:ext cx="9072000" cy="1261800"/>
           </a:xfrm>
           <a:prstGeom prst="rect">
             <a:avLst/>
@@ -1216,8 +1216,9 @@
         <p:txBody>
           <a:bodyPr lIns="0" rIns="0" tIns="0" bIns="0" anchor="ctr"/>
           <a:p>
+            <a:pPr algn="ctr"/>
             <a:r>
-              <a:rPr lang="en-US">
+              <a:rPr lang="en-US" sz="4400">
                 <a:latin typeface="Arial"/>
               </a:rPr>
               <a:t>Click to edit the title text format</a:t>
@@ -1393,7 +1394,7 @@
         <p:spPr>
           <a:xfrm>
             <a:off x="504000" y="301320"/>
-            <a:ext cx="9071280" cy="1261800"/>
+            <a:ext cx="9070920" cy="1261440"/>
           </a:xfrm>
           <a:prstGeom prst="rect">
             <a:avLst/>
@@ -1413,7 +1414,7 @@
         <p:spPr>
           <a:xfrm>
             <a:off x="504000" y="1769040"/>
-            <a:ext cx="9071280" cy="4384080"/>
+            <a:ext cx="9070920" cy="4383720"/>
           </a:xfrm>
           <a:prstGeom prst="rect">
             <a:avLst/>
@@ -1439,7 +1440,7 @@
         <p:spPr>
           <a:xfrm>
             <a:off x="0" y="0"/>
-            <a:ext cx="7559640" cy="7559640"/>
+            <a:ext cx="7559280" cy="7559280"/>
           </a:xfrm>
           <a:prstGeom prst="rect">
             <a:avLst/>
@@ -1451,18 +1452,24 @@
       </p:pic>
       <p:sp>
         <p:nvSpPr>
-          <p:cNvPr id="39" name="TextShape 3"/>
-          <p:cNvSpPr txBox="1"/>
+          <p:cNvPr id="39" name="CustomShape 3"/>
+          <p:cNvSpPr/>
           <p:nvPr/>
         </p:nvSpPr>
         <p:spPr>
           <a:xfrm>
             <a:off x="0" y="4499280"/>
-            <a:ext cx="10080720" cy="3061080"/>
-          </a:xfrm>
-          <a:prstGeom prst="rect">
-            <a:avLst/>
-          </a:prstGeom>
+            <a:ext cx="10080360" cy="3060720"/>
+          </a:xfrm>
+          <a:prstGeom prst="rect">
+            <a:avLst/>
+          </a:prstGeom>
+          <a:solidFill>
+            <a:srgbClr val="000000"/>
+          </a:solidFill>
+          <a:ln>
+            <a:noFill/>
+          </a:ln>
         </p:spPr>
         <p:txBody>
           <a:bodyPr lIns="0" rIns="0" tIns="0" bIns="0" anchor="ctr"/>
@@ -1480,52 +1487,50 @@
               </a:rPr>
               <a:t>Just back up the assetstore &amp; DB,” </a:t>
             </a:r>
+            <a:endParaRPr/>
+          </a:p>
+          <a:p>
+            <a:pPr algn="ctr">
+              <a:lnSpc>
+                <a:spcPct val="100000"/>
+              </a:lnSpc>
+            </a:pPr>
             <a:r>
               <a:rPr lang="en-US" sz="4400">
                 <a:latin typeface="Copse"/>
               </a:rPr>
-              <a:t>
-</a:t>
+              <a:t>they said.</a:t>
             </a:r>
-            <a:r>
-              <a:rPr lang="en-US" sz="4400">
-                <a:latin typeface="Copse"/>
-              </a:rPr>
-              <a:t>they </a:t>
-            </a:r>
-            <a:r>
-              <a:rPr lang="en-US" sz="4400">
-                <a:latin typeface="Copse"/>
-              </a:rPr>
-              <a:t>said</a:t>
-            </a:r>
-            <a:r>
-              <a:rPr lang="en-US" sz="4400">
-                <a:latin typeface="Copse"/>
-              </a:rPr>
-              <a:t>.</a:t>
-            </a:r>
-            <a:endParaRPr/>
-          </a:p>
-          <a:p>
-            <a:pPr algn="ctr"/>
-            <a:endParaRPr/>
-          </a:p>
-          <a:p>
-            <a:pPr algn="ctr"/>
+            <a:endParaRPr/>
+          </a:p>
+          <a:p>
+            <a:pPr algn="ctr">
+              <a:lnSpc>
+                <a:spcPct val="100000"/>
+              </a:lnSpc>
+            </a:pPr>
+            <a:endParaRPr/>
+          </a:p>
+          <a:p>
+            <a:pPr algn="ctr">
+              <a:lnSpc>
+                <a:spcPct val="100000"/>
+              </a:lnSpc>
+            </a:pPr>
             <a:r>
               <a:rPr lang="en-US" sz="2800">
                 <a:latin typeface="Copse"/>
               </a:rPr>
               <a:t>Digital Preservation the Hard Way</a:t>
             </a:r>
-            <a:r>
-              <a:rPr lang="en-US" sz="2800">
-                <a:latin typeface="Copse"/>
-              </a:rPr>
-              <a:t>
-</a:t>
-            </a:r>
+            <a:endParaRPr/>
+          </a:p>
+          <a:p>
+            <a:pPr algn="ctr">
+              <a:lnSpc>
+                <a:spcPct val="100000"/>
+              </a:lnSpc>
+            </a:pPr>
             <a:r>
               <a:rPr lang="en-US" sz="2800">
                 <a:latin typeface="Copse"/>
@@ -1535,7 +1540,11 @@
             <a:endParaRPr/>
           </a:p>
           <a:p>
-            <a:pPr algn="ctr"/>
+            <a:pPr algn="ctr">
+              <a:lnSpc>
+                <a:spcPct val="100000"/>
+              </a:lnSpc>
+            </a:pPr>
             <a:endParaRPr/>
           </a:p>
         </p:txBody>

</xml_diff>